<commit_message>
Format + self consistency
</commit_message>
<xml_diff>
--- a/pptx/6-13-2023.pptx
+++ b/pptx/6-13-2023.pptx
@@ -8,8 +8,8 @@
     <p:sldId id="256" r:id="rId2"/>
     <p:sldId id="257" r:id="rId3"/>
     <p:sldId id="261" r:id="rId4"/>
-    <p:sldId id="259" r:id="rId5"/>
-    <p:sldId id="262" r:id="rId6"/>
+    <p:sldId id="262" r:id="rId5"/>
+    <p:sldId id="264" r:id="rId6"/>
     <p:sldId id="263" r:id="rId7"/>
   </p:sldIdLst>
   <p:sldSz cx="12192000" cy="6858000"/>
@@ -109,6 +109,11 @@
       </a:defRPr>
     </a:lvl9pPr>
   </p:defaultTextStyle>
+  <p:extLst>
+    <p:ext uri="{EFAFB233-063F-42B5-8137-9DF3F51BA10A}">
+      <p15:sldGuideLst xmlns:p15="http://schemas.microsoft.com/office/powerpoint/2012/main"/>
+    </p:ext>
+  </p:extLst>
 </p:presentation>
 </file>
 
@@ -259,7 +264,7 @@
           <a:p>
             <a:fld id="{C52CAB95-5C98-1643-B51E-C6079E60D12A}" type="datetimeFigureOut">
               <a:rPr lang="en-US" smtClean="0"/>
-              <a:t>6/13/23</a:t>
+              <a:t>7/5/23</a:t>
             </a:fld>
             <a:endParaRPr lang="en-US"/>
           </a:p>
@@ -457,7 +462,7 @@
           <a:p>
             <a:fld id="{C52CAB95-5C98-1643-B51E-C6079E60D12A}" type="datetimeFigureOut">
               <a:rPr lang="en-US" smtClean="0"/>
-              <a:t>6/13/23</a:t>
+              <a:t>7/5/23</a:t>
             </a:fld>
             <a:endParaRPr lang="en-US"/>
           </a:p>
@@ -665,7 +670,7 @@
           <a:p>
             <a:fld id="{C52CAB95-5C98-1643-B51E-C6079E60D12A}" type="datetimeFigureOut">
               <a:rPr lang="en-US" smtClean="0"/>
-              <a:t>6/13/23</a:t>
+              <a:t>7/5/23</a:t>
             </a:fld>
             <a:endParaRPr lang="en-US"/>
           </a:p>
@@ -863,7 +868,7 @@
           <a:p>
             <a:fld id="{C52CAB95-5C98-1643-B51E-C6079E60D12A}" type="datetimeFigureOut">
               <a:rPr lang="en-US" smtClean="0"/>
-              <a:t>6/13/23</a:t>
+              <a:t>7/5/23</a:t>
             </a:fld>
             <a:endParaRPr lang="en-US"/>
           </a:p>
@@ -1138,7 +1143,7 @@
           <a:p>
             <a:fld id="{C52CAB95-5C98-1643-B51E-C6079E60D12A}" type="datetimeFigureOut">
               <a:rPr lang="en-US" smtClean="0"/>
-              <a:t>6/13/23</a:t>
+              <a:t>7/5/23</a:t>
             </a:fld>
             <a:endParaRPr lang="en-US"/>
           </a:p>
@@ -1403,7 +1408,7 @@
           <a:p>
             <a:fld id="{C52CAB95-5C98-1643-B51E-C6079E60D12A}" type="datetimeFigureOut">
               <a:rPr lang="en-US" smtClean="0"/>
-              <a:t>6/13/23</a:t>
+              <a:t>7/5/23</a:t>
             </a:fld>
             <a:endParaRPr lang="en-US"/>
           </a:p>
@@ -1815,7 +1820,7 @@
           <a:p>
             <a:fld id="{C52CAB95-5C98-1643-B51E-C6079E60D12A}" type="datetimeFigureOut">
               <a:rPr lang="en-US" smtClean="0"/>
-              <a:t>6/13/23</a:t>
+              <a:t>7/5/23</a:t>
             </a:fld>
             <a:endParaRPr lang="en-US"/>
           </a:p>
@@ -1956,7 +1961,7 @@
           <a:p>
             <a:fld id="{C52CAB95-5C98-1643-B51E-C6079E60D12A}" type="datetimeFigureOut">
               <a:rPr lang="en-US" smtClean="0"/>
-              <a:t>6/13/23</a:t>
+              <a:t>7/5/23</a:t>
             </a:fld>
             <a:endParaRPr lang="en-US"/>
           </a:p>
@@ -2069,7 +2074,7 @@
           <a:p>
             <a:fld id="{C52CAB95-5C98-1643-B51E-C6079E60D12A}" type="datetimeFigureOut">
               <a:rPr lang="en-US" smtClean="0"/>
-              <a:t>6/13/23</a:t>
+              <a:t>7/5/23</a:t>
             </a:fld>
             <a:endParaRPr lang="en-US"/>
           </a:p>
@@ -2380,7 +2385,7 @@
           <a:p>
             <a:fld id="{C52CAB95-5C98-1643-B51E-C6079E60D12A}" type="datetimeFigureOut">
               <a:rPr lang="en-US" smtClean="0"/>
-              <a:t>6/13/23</a:t>
+              <a:t>7/5/23</a:t>
             </a:fld>
             <a:endParaRPr lang="en-US"/>
           </a:p>
@@ -2668,7 +2673,7 @@
           <a:p>
             <a:fld id="{C52CAB95-5C98-1643-B51E-C6079E60D12A}" type="datetimeFigureOut">
               <a:rPr lang="en-US" smtClean="0"/>
-              <a:t>6/13/23</a:t>
+              <a:t>7/5/23</a:t>
             </a:fld>
             <a:endParaRPr lang="en-US"/>
           </a:p>
@@ -2909,7 +2914,7 @@
           <a:p>
             <a:fld id="{C52CAB95-5C98-1643-B51E-C6079E60D12A}" type="datetimeFigureOut">
               <a:rPr lang="en-US" smtClean="0"/>
-              <a:t>6/13/23</a:t>
+              <a:t>7/5/23</a:t>
             </a:fld>
             <a:endParaRPr lang="en-US"/>
           </a:p>
@@ -3349,7 +3354,7 @@
           <a:p>
             <a:r>
               <a:rPr lang="en-US" dirty="0"/>
-              <a:t>Baseline Update</a:t>
+              <a:t>7/5/2023 Update</a:t>
             </a:r>
           </a:p>
         </p:txBody>
@@ -3376,8 +3381,12 @@
           <a:lstStyle/>
           <a:p>
             <a:r>
+              <a:rPr lang="en-US"/>
+              <a:t>John </a:t>
+            </a:r>
+            <a:r>
               <a:rPr lang="en-US" dirty="0"/>
-              <a:t>6/13/2023, John Lee</a:t>
+              <a:t>Lee</a:t>
             </a:r>
           </a:p>
         </p:txBody>
@@ -3463,13 +3472,13 @@
           <a:p>
             <a:r>
               <a:rPr lang="en-US" dirty="0"/>
-              <a:t>10 samples randomly selected from test set</a:t>
+              <a:t>20 samples randomly selected from test set</a:t>
             </a:r>
           </a:p>
           <a:p>
             <a:r>
               <a:rPr lang="en-US" dirty="0"/>
-              <a:t>For few shot, 8 randomly selected ICL samples from train set</a:t>
+              <a:t>For few shot, 5 randomly selected ICL samples from train set</a:t>
             </a:r>
           </a:p>
           <a:p>
@@ -3478,7 +3487,7 @@
           <a:p>
             <a:r>
               <a:rPr lang="en-US" dirty="0"/>
-              <a:t>Ran using GPT-3.5-turbo</a:t>
+              <a:t>Ran using GPT-4, with Temperature 0 and n = 1.</a:t>
             </a:r>
           </a:p>
         </p:txBody>
@@ -3941,7 +3950,7 @@
           <p:cNvPr id="2" name="Title 1">
             <a:extLst>
               <a:ext uri="{FF2B5EF4-FFF2-40B4-BE49-F238E27FC236}">
-                <a16:creationId xmlns:a16="http://schemas.microsoft.com/office/drawing/2014/main" id="{D89A9B73-9923-2C3D-0D86-DD8C3FC1E486}"/>
+                <a16:creationId xmlns:a16="http://schemas.microsoft.com/office/drawing/2014/main" id="{89E4AC4C-A04E-697A-DD8B-C3DB2A0C0643}"/>
               </a:ext>
             </a:extLst>
           </p:cNvPr>
@@ -3957,10 +3966,7 @@
           <a:bodyPr/>
           <a:lstStyle/>
           <a:p>
-            <a:r>
-              <a:rPr lang="en-US" dirty="0"/>
-              <a:t>Results – Zero Shot</a:t>
-            </a:r>
+            <a:endParaRPr lang="en-US" dirty="0"/>
           </a:p>
         </p:txBody>
       </p:sp>
@@ -3969,104 +3975,55 @@
           <p:cNvPr id="3" name="Content Placeholder 2">
             <a:extLst>
               <a:ext uri="{FF2B5EF4-FFF2-40B4-BE49-F238E27FC236}">
-                <a16:creationId xmlns:a16="http://schemas.microsoft.com/office/drawing/2014/main" id="{6E51EECC-1791-265D-516C-8B6CB694CA38}"/>
-              </a:ext>
-            </a:extLst>
-          </p:cNvPr>
-          <p:cNvSpPr>
-            <a:spLocks noGrp="1"/>
-          </p:cNvSpPr>
-          <p:nvPr>
-            <p:ph idx="1"/>
-          </p:nvPr>
-        </p:nvSpPr>
-        <p:spPr>
-          <a:xfrm>
-            <a:off x="7304690" y="1825625"/>
-            <a:ext cx="4049110" cy="4351338"/>
-          </a:xfrm>
-        </p:spPr>
-        <p:txBody>
-          <a:bodyPr>
-            <a:normAutofit fontScale="92500" lnSpcReduction="10000"/>
-          </a:bodyPr>
-          <a:lstStyle/>
-          <a:p>
-            <a:pPr algn="just"/>
-            <a:r>
-              <a:rPr lang="en-US" sz="1600" b="0" i="0" dirty="0">
-                <a:effectLst/>
-                <a:latin typeface="Menlo" panose="020B0609030804020204" pitchFamily="49" charset="0"/>
-              </a:rPr>
-              <a:t>Predicted: [CH3:1][O:2][C:3]([CH2:4][CH2:5][c:6]1[cH:7][c:8]([CH2:12][NH:13][CH2:14][c:15]2[cH:16][cH:17][c:18](-[c:21]3[cH:22][n:23][cH:24][n:25][cH:26]3)[cH:19][cH:20]2)[cH:9][cH:10][cH:11]1)([N+:29]([CH3:43])([CH2:42][N-:41]([CH2:44][CH3:45])[CH2:40][CH3:39])[Cl-:28])=[O:27] </a:t>
-            </a:r>
-          </a:p>
-          <a:p>
-            <a:pPr algn="just"/>
-            <a:r>
-              <a:rPr lang="en-US" sz="1600" b="0" i="0" dirty="0">
-                <a:effectLst/>
-                <a:latin typeface="Menlo" panose="020B0609030804020204" pitchFamily="49" charset="0"/>
-              </a:rPr>
-              <a:t>Truth: [CH3:1][O:2][C:3]([CH2:4][CH2:5][c:6]1[cH:7][c:8]([CH2:12][N:13]([CH2:14][c:15]2[cH:16][cH:17][c:18](-[c:21]3[cH:22][n:23][cH:24][n:25][cH:26]3)[cH:19][cH:20]2)[S:35]([c:30]2[n:29][cH:34][cH:33][cH:32][cH:31]2)(=[O:36])=[O:37])[cH:9][cH:10][cH:11]1)=[O:27]</a:t>
-            </a:r>
-            <a:endParaRPr lang="en-US" sz="1600" dirty="0"/>
-          </a:p>
-        </p:txBody>
-      </p:sp>
-      <p:sp>
-        <p:nvSpPr>
-          <p:cNvPr id="4" name="TextBox 3">
-            <a:extLst>
-              <a:ext uri="{FF2B5EF4-FFF2-40B4-BE49-F238E27FC236}">
-                <a16:creationId xmlns:a16="http://schemas.microsoft.com/office/drawing/2014/main" id="{5B29C88A-798D-9E44-9B38-97F91E15EE91}"/>
-              </a:ext>
-            </a:extLst>
-          </p:cNvPr>
-          <p:cNvSpPr txBox="1"/>
-          <p:nvPr/>
-        </p:nvSpPr>
-        <p:spPr>
-          <a:xfrm>
-            <a:off x="838200" y="1825624"/>
-            <a:ext cx="5089634" cy="1015663"/>
-          </a:xfrm>
-          <a:prstGeom prst="rect">
-            <a:avLst/>
-          </a:prstGeom>
-          <a:noFill/>
-        </p:spPr>
-        <p:txBody>
-          <a:bodyPr wrap="square" rtlCol="0">
-            <a:spAutoFit/>
-          </a:bodyPr>
-          <a:lstStyle/>
-          <a:p>
-            <a:pPr marL="285750" indent="-285750">
-              <a:buFontTx/>
-              <a:buChar char="-"/>
-            </a:pPr>
-            <a:r>
-              <a:rPr lang="en-US" sz="2000" dirty="0"/>
-              <a:t>No exact matches</a:t>
-            </a:r>
-          </a:p>
-          <a:p>
-            <a:pPr marL="285750" indent="-285750">
-              <a:buFontTx/>
-              <a:buChar char="-"/>
-            </a:pPr>
-            <a:r>
-              <a:rPr lang="en-US" sz="2000" dirty="0"/>
-              <a:t>Some are close, like to the right, but many aren’t.</a:t>
-            </a:r>
+                <a16:creationId xmlns:a16="http://schemas.microsoft.com/office/drawing/2014/main" id="{8798545A-51E9-12D1-7D26-AA18E0E9E387}"/>
+              </a:ext>
+            </a:extLst>
+          </p:cNvPr>
+          <p:cNvSpPr>
+            <a:spLocks noGrp="1"/>
+          </p:cNvSpPr>
+          <p:nvPr>
+            <p:ph sz="half" idx="1"/>
+          </p:nvPr>
+        </p:nvSpPr>
+        <p:spPr/>
+        <p:txBody>
+          <a:bodyPr/>
+          <a:lstStyle/>
+          <a:p>
+            <a:endParaRPr lang="en-US"/>
+          </a:p>
+        </p:txBody>
+      </p:sp>
+      <p:sp>
+        <p:nvSpPr>
+          <p:cNvPr id="4" name="Content Placeholder 3">
+            <a:extLst>
+              <a:ext uri="{FF2B5EF4-FFF2-40B4-BE49-F238E27FC236}">
+                <a16:creationId xmlns:a16="http://schemas.microsoft.com/office/drawing/2014/main" id="{A5E9F616-96B0-69C9-5CFC-6722DD5B51B7}"/>
+              </a:ext>
+            </a:extLst>
+          </p:cNvPr>
+          <p:cNvSpPr>
+            <a:spLocks noGrp="1"/>
+          </p:cNvSpPr>
+          <p:nvPr>
+            <p:ph sz="half" idx="2"/>
+          </p:nvPr>
+        </p:nvSpPr>
+        <p:spPr/>
+        <p:txBody>
+          <a:bodyPr/>
+          <a:lstStyle/>
+          <a:p>
+            <a:endParaRPr lang="en-US"/>
           </a:p>
         </p:txBody>
       </p:sp>
     </p:spTree>
     <p:extLst>
       <p:ext uri="{BB962C8B-B14F-4D97-AF65-F5344CB8AC3E}">
-        <p14:creationId xmlns:p14="http://schemas.microsoft.com/office/powerpoint/2010/main" val="2293992345"/>
+        <p14:creationId xmlns:p14="http://schemas.microsoft.com/office/powerpoint/2010/main" val="2987923921"/>
       </p:ext>
     </p:extLst>
   </p:cSld>
@@ -4098,7 +4055,7 @@
           <p:cNvPr id="2" name="Title 1">
             <a:extLst>
               <a:ext uri="{FF2B5EF4-FFF2-40B4-BE49-F238E27FC236}">
-                <a16:creationId xmlns:a16="http://schemas.microsoft.com/office/drawing/2014/main" id="{D89A9B73-9923-2C3D-0D86-DD8C3FC1E486}"/>
+                <a16:creationId xmlns:a16="http://schemas.microsoft.com/office/drawing/2014/main" id="{48708296-9B0F-01CB-2B62-755C90EBB4EF}"/>
               </a:ext>
             </a:extLst>
           </p:cNvPr>
@@ -4114,143 +4071,39 @@
           <a:bodyPr/>
           <a:lstStyle/>
           <a:p>
-            <a:r>
-              <a:rPr lang="en-US" dirty="0"/>
-              <a:t>Results – Zero Shot</a:t>
-            </a:r>
-          </a:p>
-        </p:txBody>
-      </p:sp>
-      <p:sp>
-        <p:nvSpPr>
-          <p:cNvPr id="3" name="Content Placeholder 2">
-            <a:extLst>
-              <a:ext uri="{FF2B5EF4-FFF2-40B4-BE49-F238E27FC236}">
-                <a16:creationId xmlns:a16="http://schemas.microsoft.com/office/drawing/2014/main" id="{6E51EECC-1791-265D-516C-8B6CB694CA38}"/>
-              </a:ext>
-            </a:extLst>
-          </p:cNvPr>
-          <p:cNvSpPr>
-            <a:spLocks noGrp="1"/>
-          </p:cNvSpPr>
-          <p:nvPr>
-            <p:ph idx="1"/>
-          </p:nvPr>
-        </p:nvSpPr>
-        <p:spPr>
-          <a:xfrm>
-            <a:off x="7304690" y="1825625"/>
-            <a:ext cx="4049110" cy="4351338"/>
-          </a:xfrm>
-        </p:spPr>
-        <p:txBody>
-          <a:bodyPr>
-            <a:normAutofit fontScale="92500" lnSpcReduction="10000"/>
-          </a:bodyPr>
-          <a:lstStyle/>
-          <a:p>
-            <a:pPr algn="just"/>
-            <a:r>
-              <a:rPr lang="en-US" sz="1600" b="0" i="0" dirty="0">
-                <a:effectLst/>
-                <a:latin typeface="Menlo" panose="020B0609030804020204" pitchFamily="49" charset="0"/>
-              </a:rPr>
-              <a:t>Predicted: [CH3:1][O:2][C:3]([CH2:4][CH2:5][c:6]1[cH:7][c:8]([CH2:12][NH:13][CH2:14][c:15]2[cH:16][cH:17][c:18](-[c:21]3[cH:22][n:23][cH:24][n:25][cH:26]3)[cH:19][cH:20]2)[cH:9][cH:10][cH:11]1)([N+:29]([CH3:43])([CH2:42][N-:41]([CH2:44][CH3:45])[CH2:40][CH3:39])[Cl-:28])=[O:27] </a:t>
-            </a:r>
-          </a:p>
-          <a:p>
-            <a:pPr algn="just"/>
-            <a:r>
-              <a:rPr lang="en-US" sz="1600" b="0" i="0" dirty="0">
-                <a:effectLst/>
-                <a:latin typeface="Menlo" panose="020B0609030804020204" pitchFamily="49" charset="0"/>
-              </a:rPr>
-              <a:t>Truth: [CH3:1][O:2][C:3]([CH2:4][CH2:5][c:6]1[cH:7][c:8]([CH2:12][N:13]([CH2:14][c:15]2[cH:16][cH:17][c:18](-[c:21]3[cH:22][n:23][cH:24][n:25][cH:26]3)[cH:19][cH:20]2)[S:35]([c:30]2[n:29][cH:34][cH:33][cH:32][cH:31]2)(=[O:36])=[O:37])[cH:9][cH:10][cH:11]1)=[O:27]</a:t>
-            </a:r>
-            <a:endParaRPr lang="en-US" sz="1600" dirty="0"/>
-          </a:p>
-        </p:txBody>
-      </p:sp>
-      <p:sp>
-        <p:nvSpPr>
-          <p:cNvPr id="4" name="TextBox 3">
-            <a:extLst>
-              <a:ext uri="{FF2B5EF4-FFF2-40B4-BE49-F238E27FC236}">
-                <a16:creationId xmlns:a16="http://schemas.microsoft.com/office/drawing/2014/main" id="{5B29C88A-798D-9E44-9B38-97F91E15EE91}"/>
-              </a:ext>
-            </a:extLst>
-          </p:cNvPr>
-          <p:cNvSpPr txBox="1"/>
-          <p:nvPr/>
-        </p:nvSpPr>
-        <p:spPr>
-          <a:xfrm>
-            <a:off x="838200" y="1825624"/>
-            <a:ext cx="5089634" cy="2862322"/>
-          </a:xfrm>
-          <a:prstGeom prst="rect">
-            <a:avLst/>
-          </a:prstGeom>
-          <a:noFill/>
-        </p:spPr>
-        <p:txBody>
-          <a:bodyPr wrap="square" rtlCol="0">
-            <a:spAutoFit/>
-          </a:bodyPr>
-          <a:lstStyle/>
-          <a:p>
-            <a:pPr marL="285750" indent="-285750">
-              <a:buFontTx/>
-              <a:buChar char="-"/>
-            </a:pPr>
-            <a:r>
-              <a:rPr lang="en-US" sz="2000" dirty="0"/>
-              <a:t>No exact matches</a:t>
-            </a:r>
-          </a:p>
-          <a:p>
-            <a:pPr marL="285750" indent="-285750">
-              <a:buFontTx/>
-              <a:buChar char="-"/>
-            </a:pPr>
-            <a:r>
-              <a:rPr lang="en-US" sz="2000" dirty="0"/>
-              <a:t>Some are close, like to the right, but many aren’t.</a:t>
-            </a:r>
-          </a:p>
-          <a:p>
-            <a:pPr marL="285750" indent="-285750">
-              <a:buFontTx/>
-              <a:buChar char="-"/>
-            </a:pPr>
-            <a:endParaRPr lang="en-US" sz="2000" dirty="0"/>
-          </a:p>
-          <a:p>
-            <a:pPr marL="285750" indent="-285750">
-              <a:buFontTx/>
-              <a:buChar char="-"/>
-            </a:pPr>
-            <a:r>
-              <a:rPr lang="en-US" sz="2000" dirty="0"/>
-              <a:t>Additional problem that the model learned there can be multiple products, which introduces confusion.</a:t>
-            </a:r>
-          </a:p>
-          <a:p>
-            <a:pPr marL="742950" lvl="1" indent="-285750">
-              <a:buFontTx/>
-              <a:buChar char="-"/>
-            </a:pPr>
-            <a:r>
-              <a:rPr lang="en-US" sz="2000" dirty="0"/>
-              <a:t>Many cases do have multiple products, but not all.</a:t>
-            </a:r>
+            <a:endParaRPr lang="en-US" dirty="0"/>
+          </a:p>
+        </p:txBody>
+      </p:sp>
+      <p:sp>
+        <p:nvSpPr>
+          <p:cNvPr id="3" name="Text Placeholder 2">
+            <a:extLst>
+              <a:ext uri="{FF2B5EF4-FFF2-40B4-BE49-F238E27FC236}">
+                <a16:creationId xmlns:a16="http://schemas.microsoft.com/office/drawing/2014/main" id="{327731A9-7BB1-9FF5-2B6D-55B9A3347D2D}"/>
+              </a:ext>
+            </a:extLst>
+          </p:cNvPr>
+          <p:cNvSpPr>
+            <a:spLocks noGrp="1"/>
+          </p:cNvSpPr>
+          <p:nvPr>
+            <p:ph type="body" idx="1"/>
+          </p:nvPr>
+        </p:nvSpPr>
+        <p:spPr/>
+        <p:txBody>
+          <a:bodyPr/>
+          <a:lstStyle/>
+          <a:p>
+            <a:endParaRPr lang="en-US"/>
           </a:p>
         </p:txBody>
       </p:sp>
     </p:spTree>
     <p:extLst>
       <p:ext uri="{BB962C8B-B14F-4D97-AF65-F5344CB8AC3E}">
-        <p14:creationId xmlns:p14="http://schemas.microsoft.com/office/powerpoint/2010/main" val="3287478316"/>
+        <p14:creationId xmlns:p14="http://schemas.microsoft.com/office/powerpoint/2010/main" val="3426000925"/>
       </p:ext>
     </p:extLst>
   </p:cSld>
@@ -4277,80 +4130,298 @@
           <a:chExt cx="0" cy="0"/>
         </a:xfrm>
       </p:grpSpPr>
-      <p:sp>
-        <p:nvSpPr>
-          <p:cNvPr id="2" name="Title 1">
-            <a:extLst>
-              <a:ext uri="{FF2B5EF4-FFF2-40B4-BE49-F238E27FC236}">
-                <a16:creationId xmlns:a16="http://schemas.microsoft.com/office/drawing/2014/main" id="{167ED203-B2CA-32EA-04D2-CB938F155964}"/>
-              </a:ext>
-            </a:extLst>
-          </p:cNvPr>
-          <p:cNvSpPr>
-            <a:spLocks noGrp="1"/>
-          </p:cNvSpPr>
-          <p:nvPr>
-            <p:ph type="title"/>
-          </p:nvPr>
-        </p:nvSpPr>
-        <p:spPr/>
-        <p:txBody>
-          <a:bodyPr/>
-          <a:lstStyle/>
-          <a:p>
-            <a:r>
-              <a:rPr lang="en-US" dirty="0"/>
-              <a:t>Problems</a:t>
-            </a:r>
-          </a:p>
-        </p:txBody>
-      </p:sp>
-      <p:sp>
-        <p:nvSpPr>
-          <p:cNvPr id="3" name="Content Placeholder 2">
-            <a:extLst>
-              <a:ext uri="{FF2B5EF4-FFF2-40B4-BE49-F238E27FC236}">
-                <a16:creationId xmlns:a16="http://schemas.microsoft.com/office/drawing/2014/main" id="{BD243036-4084-400E-D4CC-BDBE01462724}"/>
-              </a:ext>
-            </a:extLst>
-          </p:cNvPr>
-          <p:cNvSpPr>
-            <a:spLocks noGrp="1"/>
-          </p:cNvSpPr>
+      <p:graphicFrame>
+        <p:nvGraphicFramePr>
+          <p:cNvPr id="4" name="Table 4">
+            <a:extLst>
+              <a:ext uri="{FF2B5EF4-FFF2-40B4-BE49-F238E27FC236}">
+                <a16:creationId xmlns:a16="http://schemas.microsoft.com/office/drawing/2014/main" id="{850EEB86-1806-D705-9FA9-36F429006BBA}"/>
+              </a:ext>
+            </a:extLst>
+          </p:cNvPr>
+          <p:cNvGraphicFramePr>
+            <a:graphicFrameLocks noGrp="1"/>
+          </p:cNvGraphicFramePr>
           <p:nvPr>
             <p:ph idx="1"/>
-          </p:nvPr>
-        </p:nvSpPr>
-        <p:spPr/>
-        <p:txBody>
-          <a:bodyPr/>
-          <a:lstStyle/>
-          <a:p>
-            <a:r>
-              <a:rPr lang="en-US" dirty="0"/>
-              <a:t>How should I evaluate accuracy?</a:t>
-            </a:r>
-          </a:p>
-          <a:p>
-            <a:r>
-              <a:rPr lang="en-US" dirty="0"/>
-              <a:t>Discussions on </a:t>
-            </a:r>
-            <a:r>
-              <a:rPr lang="en-US" dirty="0" err="1"/>
-              <a:t>CoT</a:t>
-            </a:r>
-            <a:r>
-              <a:rPr lang="en-US"/>
-              <a:t>?</a:t>
-            </a:r>
-          </a:p>
-        </p:txBody>
-      </p:sp>
+            <p:extLst>
+              <p:ext uri="{D42A27DB-BD31-4B8C-83A1-F6EECF244321}">
+                <p14:modId xmlns:p14="http://schemas.microsoft.com/office/powerpoint/2010/main" val="3816589893"/>
+              </p:ext>
+            </p:extLst>
+          </p:nvPr>
+        </p:nvGraphicFramePr>
+        <p:xfrm>
+          <a:off x="838200" y="543363"/>
+          <a:ext cx="10515600" cy="2609739"/>
+        </p:xfrm>
+        <a:graphic>
+          <a:graphicData uri="http://schemas.openxmlformats.org/drawingml/2006/table">
+            <a:tbl>
+              <a:tblPr firstRow="1" bandRow="1">
+                <a:tableStyleId>{5C22544A-7EE6-4342-B048-85BDC9FD1C3A}</a:tableStyleId>
+              </a:tblPr>
+              <a:tblGrid>
+                <a:gridCol w="2103120">
+                  <a:extLst>
+                    <a:ext uri="{9D8B030D-6E8A-4147-A177-3AD203B41FA5}">
+                      <a16:colId xmlns:a16="http://schemas.microsoft.com/office/drawing/2014/main" val="1124350929"/>
+                    </a:ext>
+                  </a:extLst>
+                </a:gridCol>
+                <a:gridCol w="2103120">
+                  <a:extLst>
+                    <a:ext uri="{9D8B030D-6E8A-4147-A177-3AD203B41FA5}">
+                      <a16:colId xmlns:a16="http://schemas.microsoft.com/office/drawing/2014/main" val="2955728604"/>
+                    </a:ext>
+                  </a:extLst>
+                </a:gridCol>
+                <a:gridCol w="2103120">
+                  <a:extLst>
+                    <a:ext uri="{9D8B030D-6E8A-4147-A177-3AD203B41FA5}">
+                      <a16:colId xmlns:a16="http://schemas.microsoft.com/office/drawing/2014/main" val="87976513"/>
+                    </a:ext>
+                  </a:extLst>
+                </a:gridCol>
+                <a:gridCol w="2103120">
+                  <a:extLst>
+                    <a:ext uri="{9D8B030D-6E8A-4147-A177-3AD203B41FA5}">
+                      <a16:colId xmlns:a16="http://schemas.microsoft.com/office/drawing/2014/main" val="1645385692"/>
+                    </a:ext>
+                  </a:extLst>
+                </a:gridCol>
+                <a:gridCol w="2103120">
+                  <a:extLst>
+                    <a:ext uri="{9D8B030D-6E8A-4147-A177-3AD203B41FA5}">
+                      <a16:colId xmlns:a16="http://schemas.microsoft.com/office/drawing/2014/main" val="967407893"/>
+                    </a:ext>
+                  </a:extLst>
+                </a:gridCol>
+              </a:tblGrid>
+              <a:tr h="869913">
+                <a:tc>
+                  <a:txBody>
+                    <a:bodyPr/>
+                    <a:lstStyle/>
+                    <a:p>
+                      <a:r>
+                        <a:rPr lang="en-US" dirty="0"/>
+                        <a:t>Method (n = 5)</a:t>
+                      </a:r>
+                    </a:p>
+                  </a:txBody>
+                  <a:tcPr/>
+                </a:tc>
+                <a:tc>
+                  <a:txBody>
+                    <a:bodyPr/>
+                    <a:lstStyle/>
+                    <a:p>
+                      <a:r>
+                        <a:rPr lang="en-US" dirty="0"/>
+                        <a:t>All Correct</a:t>
+                      </a:r>
+                    </a:p>
+                  </a:txBody>
+                  <a:tcPr/>
+                </a:tc>
+                <a:tc>
+                  <a:txBody>
+                    <a:bodyPr/>
+                    <a:lstStyle/>
+                    <a:p>
+                      <a:r>
+                        <a:rPr lang="en-US" dirty="0"/>
+                        <a:t>At least 1 Correct</a:t>
+                      </a:r>
+                    </a:p>
+                  </a:txBody>
+                  <a:tcPr/>
+                </a:tc>
+                <a:tc>
+                  <a:txBody>
+                    <a:bodyPr/>
+                    <a:lstStyle/>
+                    <a:p>
+                      <a:r>
+                        <a:rPr lang="en-US" dirty="0"/>
+                        <a:t>All Invalid</a:t>
+                      </a:r>
+                    </a:p>
+                  </a:txBody>
+                  <a:tcPr/>
+                </a:tc>
+                <a:tc>
+                  <a:txBody>
+                    <a:bodyPr/>
+                    <a:lstStyle/>
+                    <a:p>
+                      <a:r>
+                        <a:rPr lang="en-US" dirty="0"/>
+                        <a:t>At least 1 Invalid</a:t>
+                      </a:r>
+                    </a:p>
+                  </a:txBody>
+                  <a:tcPr/>
+                </a:tc>
+                <a:extLst>
+                  <a:ext uri="{0D108BD9-81ED-4DB2-BD59-A6C34878D82A}">
+                    <a16:rowId xmlns:a16="http://schemas.microsoft.com/office/drawing/2014/main" val="3763780731"/>
+                  </a:ext>
+                </a:extLst>
+              </a:tr>
+              <a:tr h="869913">
+                <a:tc>
+                  <a:txBody>
+                    <a:bodyPr/>
+                    <a:lstStyle/>
+                    <a:p>
+                      <a:r>
+                        <a:rPr lang="en-US" dirty="0"/>
+                        <a:t>Zero-shot</a:t>
+                      </a:r>
+                    </a:p>
+                  </a:txBody>
+                  <a:tcPr/>
+                </a:tc>
+                <a:tc>
+                  <a:txBody>
+                    <a:bodyPr/>
+                    <a:lstStyle/>
+                    <a:p>
+                      <a:r>
+                        <a:rPr lang="en-US" dirty="0"/>
+                        <a:t>0</a:t>
+                      </a:r>
+                    </a:p>
+                  </a:txBody>
+                  <a:tcPr/>
+                </a:tc>
+                <a:tc>
+                  <a:txBody>
+                    <a:bodyPr/>
+                    <a:lstStyle/>
+                    <a:p>
+                      <a:r>
+                        <a:rPr lang="en-US" dirty="0"/>
+                        <a:t>0</a:t>
+                      </a:r>
+                    </a:p>
+                  </a:txBody>
+                  <a:tcPr/>
+                </a:tc>
+                <a:tc>
+                  <a:txBody>
+                    <a:bodyPr/>
+                    <a:lstStyle/>
+                    <a:p>
+                      <a:r>
+                        <a:rPr lang="en-US" dirty="0"/>
+                        <a:t>1</a:t>
+                      </a:r>
+                    </a:p>
+                  </a:txBody>
+                  <a:tcPr/>
+                </a:tc>
+                <a:tc>
+                  <a:txBody>
+                    <a:bodyPr/>
+                    <a:lstStyle/>
+                    <a:p>
+                      <a:r>
+                        <a:rPr lang="en-US" dirty="0"/>
+                        <a:t>12</a:t>
+                      </a:r>
+                    </a:p>
+                  </a:txBody>
+                  <a:tcPr/>
+                </a:tc>
+                <a:extLst>
+                  <a:ext uri="{0D108BD9-81ED-4DB2-BD59-A6C34878D82A}">
+                    <a16:rowId xmlns:a16="http://schemas.microsoft.com/office/drawing/2014/main" val="2718471499"/>
+                  </a:ext>
+                </a:extLst>
+              </a:tr>
+              <a:tr h="869913">
+                <a:tc>
+                  <a:txBody>
+                    <a:bodyPr/>
+                    <a:lstStyle/>
+                    <a:p>
+                      <a:r>
+                        <a:rPr lang="en-US" dirty="0"/>
+                        <a:t>Few-shot (k = 5)</a:t>
+                      </a:r>
+                    </a:p>
+                  </a:txBody>
+                  <a:tcPr/>
+                </a:tc>
+                <a:tc>
+                  <a:txBody>
+                    <a:bodyPr/>
+                    <a:lstStyle/>
+                    <a:p>
+                      <a:r>
+                        <a:rPr lang="en-US" dirty="0"/>
+                        <a:t>1</a:t>
+                      </a:r>
+                    </a:p>
+                  </a:txBody>
+                  <a:tcPr/>
+                </a:tc>
+                <a:tc>
+                  <a:txBody>
+                    <a:bodyPr/>
+                    <a:lstStyle/>
+                    <a:p>
+                      <a:r>
+                        <a:rPr lang="en-US" dirty="0"/>
+                        <a:t>1</a:t>
+                      </a:r>
+                    </a:p>
+                  </a:txBody>
+                  <a:tcPr/>
+                </a:tc>
+                <a:tc>
+                  <a:txBody>
+                    <a:bodyPr/>
+                    <a:lstStyle/>
+                    <a:p>
+                      <a:r>
+                        <a:rPr lang="en-US" dirty="0"/>
+                        <a:t>2</a:t>
+                      </a:r>
+                    </a:p>
+                  </a:txBody>
+                  <a:tcPr/>
+                </a:tc>
+                <a:tc>
+                  <a:txBody>
+                    <a:bodyPr/>
+                    <a:lstStyle/>
+                    <a:p>
+                      <a:r>
+                        <a:rPr lang="en-US" dirty="0"/>
+                        <a:t>6</a:t>
+                      </a:r>
+                    </a:p>
+                  </a:txBody>
+                  <a:tcPr/>
+                </a:tc>
+                <a:extLst>
+                  <a:ext uri="{0D108BD9-81ED-4DB2-BD59-A6C34878D82A}">
+                    <a16:rowId xmlns:a16="http://schemas.microsoft.com/office/drawing/2014/main" val="268149145"/>
+                  </a:ext>
+                </a:extLst>
+              </a:tr>
+            </a:tbl>
+          </a:graphicData>
+        </a:graphic>
+      </p:graphicFrame>
     </p:spTree>
     <p:extLst>
       <p:ext uri="{BB962C8B-B14F-4D97-AF65-F5344CB8AC3E}">
-        <p14:creationId xmlns:p14="http://schemas.microsoft.com/office/powerpoint/2010/main" val="2743140035"/>
+        <p14:creationId xmlns:p14="http://schemas.microsoft.com/office/powerpoint/2010/main" val="3427982685"/>
       </p:ext>
     </p:extLst>
   </p:cSld>

</xml_diff>